<commit_message>
adding soc page htmls
</commit_message>
<xml_diff>
--- a/ProjectsOverview/HCI_Presentation_With_Notes.pptx
+++ b/ProjectsOverview/HCI_Presentation_With_Notes.pptx
@@ -955,7 +955,7 @@
             <a:r>
               <a:rPr lang="en-US" dirty="0"/>
               <a:t>UAV dispatcher interface overview. Emphasize multitasking, interruptions, and research motivation.
-⚠️ This slide contains confidential, unpublished thesis work.</a:t>
+Confidential unpublished work.</a:t>
             </a:r>
             <a:endParaRPr lang="en-US" dirty="0"/>
           </a:p>
@@ -1044,7 +1044,7 @@
             <a:r>
               <a:rPr lang="en-US" dirty="0"/>
               <a:t>Explain research questions and hypotheses related to situational awareness and re-engagement.
-⚠️ This slide contains confidential, unpublished thesis work.</a:t>
+Confidential unpublished work.</a:t>
             </a:r>
             <a:endParaRPr lang="en-US" dirty="0"/>
           </a:p>
@@ -1133,7 +1133,7 @@
             <a:r>
               <a:rPr lang="en-US" dirty="0"/>
               <a:t>Describe experimental design, participants, measures, and within-subjects setup.
-⚠️ This slide contains confidential, unpublished thesis work.</a:t>
+Confidential unpublished work.</a:t>
             </a:r>
             <a:endParaRPr lang="en-US" dirty="0"/>
           </a:p>
@@ -1222,7 +1222,7 @@
             <a:r>
               <a:rPr lang="en-US" dirty="0"/>
               <a:t>Walk through quantitative results and which hypotheses were supported.
-⚠️ This slide contains confidential, unpublished thesis work.</a:t>
+Confidential unpublished work.</a:t>
             </a:r>
             <a:endParaRPr lang="en-US" dirty="0"/>
           </a:p>
@@ -1311,7 +1311,7 @@
             <a:r>
               <a:rPr lang="en-US" dirty="0"/>
               <a:t>Discuss design challenges, trade-offs, and system limitations.
-⚠️ This slide contains confidential, unpublished thesis work.</a:t>
+Confidential unpublished work.</a:t>
             </a:r>
             <a:endParaRPr lang="en-US" dirty="0"/>
           </a:p>

</xml_diff>